<commit_message>
feat: changes discussed on Feb 8 meeting
</commit_message>
<xml_diff>
--- a/website/public/files/call-for-papers-xaip-2022.pptx
+++ b/website/public/files/call-for-papers-xaip-2022.pptx
@@ -243,7 +243,7 @@
           <a:p>
             <a:fld id="{12D66C06-2226-6340-8780-368BB56BF54B}" type="datetimeFigureOut">
               <a:rPr lang="en-US" smtClean="0"/>
-              <a:t>2/3/22</a:t>
+              <a:t>2/8/22</a:t>
             </a:fld>
             <a:endParaRPr lang="en-US"/>
           </a:p>
@@ -413,7 +413,7 @@
           <a:p>
             <a:fld id="{12D66C06-2226-6340-8780-368BB56BF54B}" type="datetimeFigureOut">
               <a:rPr lang="en-US" smtClean="0"/>
-              <a:t>2/3/22</a:t>
+              <a:t>2/8/22</a:t>
             </a:fld>
             <a:endParaRPr lang="en-US"/>
           </a:p>
@@ -593,7 +593,7 @@
           <a:p>
             <a:fld id="{12D66C06-2226-6340-8780-368BB56BF54B}" type="datetimeFigureOut">
               <a:rPr lang="en-US" smtClean="0"/>
-              <a:t>2/3/22</a:t>
+              <a:t>2/8/22</a:t>
             </a:fld>
             <a:endParaRPr lang="en-US"/>
           </a:p>
@@ -763,7 +763,7 @@
           <a:p>
             <a:fld id="{12D66C06-2226-6340-8780-368BB56BF54B}" type="datetimeFigureOut">
               <a:rPr lang="en-US" smtClean="0"/>
-              <a:t>2/3/22</a:t>
+              <a:t>2/8/22</a:t>
             </a:fld>
             <a:endParaRPr lang="en-US"/>
           </a:p>
@@ -1007,7 +1007,7 @@
           <a:p>
             <a:fld id="{12D66C06-2226-6340-8780-368BB56BF54B}" type="datetimeFigureOut">
               <a:rPr lang="en-US" smtClean="0"/>
-              <a:t>2/3/22</a:t>
+              <a:t>2/8/22</a:t>
             </a:fld>
             <a:endParaRPr lang="en-US"/>
           </a:p>
@@ -1239,7 +1239,7 @@
           <a:p>
             <a:fld id="{12D66C06-2226-6340-8780-368BB56BF54B}" type="datetimeFigureOut">
               <a:rPr lang="en-US" smtClean="0"/>
-              <a:t>2/3/22</a:t>
+              <a:t>2/8/22</a:t>
             </a:fld>
             <a:endParaRPr lang="en-US"/>
           </a:p>
@@ -1606,7 +1606,7 @@
           <a:p>
             <a:fld id="{12D66C06-2226-6340-8780-368BB56BF54B}" type="datetimeFigureOut">
               <a:rPr lang="en-US" smtClean="0"/>
-              <a:t>2/3/22</a:t>
+              <a:t>2/8/22</a:t>
             </a:fld>
             <a:endParaRPr lang="en-US"/>
           </a:p>
@@ -1724,7 +1724,7 @@
           <a:p>
             <a:fld id="{12D66C06-2226-6340-8780-368BB56BF54B}" type="datetimeFigureOut">
               <a:rPr lang="en-US" smtClean="0"/>
-              <a:t>2/3/22</a:t>
+              <a:t>2/8/22</a:t>
             </a:fld>
             <a:endParaRPr lang="en-US"/>
           </a:p>
@@ -1819,7 +1819,7 @@
           <a:p>
             <a:fld id="{12D66C06-2226-6340-8780-368BB56BF54B}" type="datetimeFigureOut">
               <a:rPr lang="en-US" smtClean="0"/>
-              <a:t>2/3/22</a:t>
+              <a:t>2/8/22</a:t>
             </a:fld>
             <a:endParaRPr lang="en-US"/>
           </a:p>
@@ -2096,7 +2096,7 @@
           <a:p>
             <a:fld id="{12D66C06-2226-6340-8780-368BB56BF54B}" type="datetimeFigureOut">
               <a:rPr lang="en-US" smtClean="0"/>
-              <a:t>2/3/22</a:t>
+              <a:t>2/8/22</a:t>
             </a:fld>
             <a:endParaRPr lang="en-US"/>
           </a:p>
@@ -2353,7 +2353,7 @@
           <a:p>
             <a:fld id="{12D66C06-2226-6340-8780-368BB56BF54B}" type="datetimeFigureOut">
               <a:rPr lang="en-US" smtClean="0"/>
-              <a:t>2/3/22</a:t>
+              <a:t>2/8/22</a:t>
             </a:fld>
             <a:endParaRPr lang="en-US"/>
           </a:p>
@@ -2566,7 +2566,7 @@
           <a:p>
             <a:fld id="{12D66C06-2226-6340-8780-368BB56BF54B}" type="datetimeFigureOut">
               <a:rPr lang="en-US" smtClean="0"/>
-              <a:t>2/3/22</a:t>
+              <a:t>2/8/22</a:t>
             </a:fld>
             <a:endParaRPr lang="en-US"/>
           </a:p>
@@ -3345,38 +3345,6 @@
           </a:p>
         </p:txBody>
       </p:sp>
-      <p:pic>
-        <p:nvPicPr>
-          <p:cNvPr id="3" name="Picture 2" descr="Graphical user interface, text, application&#10;&#10;Description automatically generated">
-            <a:extLst>
-              <a:ext uri="{FF2B5EF4-FFF2-40B4-BE49-F238E27FC236}">
-                <a16:creationId xmlns:a16="http://schemas.microsoft.com/office/drawing/2014/main" id="{64FA1E8A-07B2-F143-94D9-C674B47502A3}"/>
-              </a:ext>
-            </a:extLst>
-          </p:cNvPr>
-          <p:cNvPicPr>
-            <a:picLocks noChangeAspect="1"/>
-          </p:cNvPicPr>
-          <p:nvPr/>
-        </p:nvPicPr>
-        <p:blipFill rotWithShape="1">
-          <a:blip r:embed="rId9"/>
-          <a:srcRect l="-1110" t="-16081" b="-16954"/>
-          <a:stretch/>
-        </p:blipFill>
-        <p:spPr>
-          <a:xfrm>
-            <a:off x="0" y="6896219"/>
-            <a:ext cx="6858000" cy="2247781"/>
-          </a:xfrm>
-          <a:prstGeom prst="rect">
-            <a:avLst/>
-          </a:prstGeom>
-          <a:solidFill>
-            <a:srgbClr val="F4F4F4"/>
-          </a:solidFill>
-        </p:spPr>
-      </p:pic>
       <p:sp>
         <p:nvSpPr>
           <p:cNvPr id="7" name="Rectangle 6">
@@ -3463,7 +3431,7 @@
                   <a:srgbClr val="005DFF"/>
                 </a:solidFill>
                 <a:latin typeface="+mj-lt"/>
-                <a:hlinkClick r:id="rId10"/>
+                <a:hlinkClick r:id="rId9"/>
               </a:rPr>
               <a:t>http://</a:t>
             </a:r>
@@ -3473,7 +3441,7 @@
                   <a:srgbClr val="005DFF"/>
                 </a:solidFill>
                 <a:latin typeface="+mj-lt"/>
-                <a:hlinkClick r:id="rId10"/>
+                <a:hlinkClick r:id="rId9"/>
               </a:rPr>
               <a:t>xaip.mybluemix.net</a:t>
             </a:r>
@@ -3483,7 +3451,7 @@
                   <a:srgbClr val="005DFF"/>
                 </a:solidFill>
                 <a:latin typeface="+mj-lt"/>
-                <a:hlinkClick r:id="rId10"/>
+                <a:hlinkClick r:id="rId9"/>
               </a:rPr>
               <a:t>/</a:t>
             </a:r>
@@ -3496,6 +3464,117 @@
           </a:p>
         </p:txBody>
       </p:sp>
+      <p:sp>
+        <p:nvSpPr>
+          <p:cNvPr id="6" name="Rectangle 5">
+            <a:extLst>
+              <a:ext uri="{FF2B5EF4-FFF2-40B4-BE49-F238E27FC236}">
+                <a16:creationId xmlns:a16="http://schemas.microsoft.com/office/drawing/2014/main" id="{A536BD05-A840-7A4D-AB8F-90F6727A51FD}"/>
+              </a:ext>
+            </a:extLst>
+          </p:cNvPr>
+          <p:cNvSpPr/>
+          <p:nvPr/>
+        </p:nvSpPr>
+        <p:spPr>
+          <a:xfrm>
+            <a:off x="0" y="6896219"/>
+            <a:ext cx="6858000" cy="2223157"/>
+          </a:xfrm>
+          <a:prstGeom prst="rect">
+            <a:avLst/>
+          </a:prstGeom>
+          <a:solidFill>
+            <a:srgbClr val="F4F4F4"/>
+          </a:solidFill>
+          <a:ln>
+            <a:noFill/>
+          </a:ln>
+        </p:spPr>
+        <p:style>
+          <a:lnRef idx="2">
+            <a:schemeClr val="accent1">
+              <a:shade val="50000"/>
+            </a:schemeClr>
+          </a:lnRef>
+          <a:fillRef idx="1">
+            <a:schemeClr val="accent1"/>
+          </a:fillRef>
+          <a:effectRef idx="0">
+            <a:schemeClr val="accent1"/>
+          </a:effectRef>
+          <a:fontRef idx="minor">
+            <a:schemeClr val="lt1"/>
+          </a:fontRef>
+        </p:style>
+        <p:txBody>
+          <a:bodyPr rtlCol="0" anchor="ctr"/>
+          <a:lstStyle/>
+          <a:p>
+            <a:pPr algn="ctr"/>
+            <a:endParaRPr lang="en-US"/>
+          </a:p>
+        </p:txBody>
+      </p:sp>
+      <p:pic>
+        <p:nvPicPr>
+          <p:cNvPr id="4" name="Picture 3">
+            <a:extLst>
+              <a:ext uri="{FF2B5EF4-FFF2-40B4-BE49-F238E27FC236}">
+                <a16:creationId xmlns:a16="http://schemas.microsoft.com/office/drawing/2014/main" id="{3AFBE29C-007C-1A40-B9FF-1CDFF9A494E3}"/>
+              </a:ext>
+            </a:extLst>
+          </p:cNvPr>
+          <p:cNvPicPr>
+            <a:picLocks noChangeAspect="1"/>
+          </p:cNvPicPr>
+          <p:nvPr/>
+        </p:nvPicPr>
+        <p:blipFill rotWithShape="1">
+          <a:blip r:embed="rId10"/>
+          <a:srcRect b="14460"/>
+          <a:stretch/>
+        </p:blipFill>
+        <p:spPr>
+          <a:xfrm>
+            <a:off x="304332" y="7013097"/>
+            <a:ext cx="6250629" cy="1874957"/>
+          </a:xfrm>
+          <a:prstGeom prst="rect">
+            <a:avLst/>
+          </a:prstGeom>
+        </p:spPr>
+      </p:pic>
+      <p:pic>
+        <p:nvPicPr>
+          <p:cNvPr id="8" name="Picture 7">
+            <a:extLst>
+              <a:ext uri="{FF2B5EF4-FFF2-40B4-BE49-F238E27FC236}">
+                <a16:creationId xmlns:a16="http://schemas.microsoft.com/office/drawing/2014/main" id="{8D803750-3618-644E-B46B-DE9C7B7AB076}"/>
+              </a:ext>
+            </a:extLst>
+          </p:cNvPr>
+          <p:cNvPicPr>
+            <a:picLocks noChangeAspect="1"/>
+          </p:cNvPicPr>
+          <p:nvPr/>
+        </p:nvPicPr>
+        <p:blipFill>
+          <a:blip r:embed="rId11"/>
+          <a:stretch>
+            <a:fillRect/>
+          </a:stretch>
+        </p:blipFill>
+        <p:spPr>
+          <a:xfrm>
+            <a:off x="4984906" y="2898172"/>
+            <a:ext cx="758847" cy="133558"/>
+          </a:xfrm>
+          <a:prstGeom prst="rect">
+            <a:avLst/>
+          </a:prstGeom>
+        </p:spPr>
+      </p:pic>
     </p:spTree>
     <p:extLst>
       <p:ext uri="{BB962C8B-B14F-4D97-AF65-F5344CB8AC3E}">

</xml_diff>